<commit_message>
Worked with presentation notes
</commit_message>
<xml_diff>
--- a/Creating Unit Test Mocks - PHPUnit or Prophecy.pptx
+++ b/Creating Unit Test Mocks - PHPUnit or Prophecy.pptx
@@ -164,7 +164,7 @@
   </p:defaultTextStyle>
   <p:extLst>
     <p:ext uri="{EFAFB233-063F-42B5-8137-9DF3F51BA10A}">
-      <p15:sldGuideLst xmlns:p15="http://schemas.microsoft.com/office/powerpoint/2012/main" xmlns=""/>
+      <p15:sldGuideLst xmlns="" xmlns:p15="http://schemas.microsoft.com/office/powerpoint/2012/main"/>
     </p:ext>
   </p:extLst>
 </p:presentation>
@@ -38134,98 +38134,111 @@
         <p:spPr/>
         <p:txBody>
           <a:bodyPr>
-            <a:normAutofit fontScale="92500" lnSpcReduction="10000"/>
+            <a:normAutofit/>
           </a:bodyPr>
           <a:lstStyle/>
           <a:p>
             <a:pPr marL="0" indent="0">
               <a:buNone/>
             </a:pPr>
-            <a:endParaRPr lang="en-GB" sz="3000" dirty="0" smtClean="0"/>
+            <a:r>
+              <a:rPr lang="en-GB" sz="3000" dirty="0" smtClean="0"/>
+              <a:t>The </a:t>
+            </a:r>
+            <a:r>
+              <a:rPr lang="en-GB" sz="3000" dirty="0"/>
+              <a:t>Programmer's Oath</a:t>
+            </a:r>
           </a:p>
           <a:p>
             <a:pPr marL="0" indent="0">
               <a:buNone/>
             </a:pPr>
             <a:r>
-              <a:rPr lang="en-GB" sz="3000" dirty="0" smtClean="0"/>
-              <a:t>The </a:t>
-            </a:r>
-            <a:r>
-              <a:rPr lang="en-GB" sz="3000" dirty="0"/>
-              <a:t>Programmer's Oath</a:t>
-            </a:r>
+              <a:rPr lang="en-GB" sz="2000" dirty="0"/>
+              <a:t>http://blog.cleancoder.com/uncle-bob/2015/11/18/TheProgrammersOath.html</a:t>
+            </a:r>
+            <a:endParaRPr lang="en-GB" sz="2400" dirty="0"/>
           </a:p>
           <a:p>
             <a:pPr marL="0" indent="0">
               <a:buNone/>
             </a:pPr>
             <a:r>
-              <a:rPr lang="en-GB" sz="2200" dirty="0"/>
-              <a:t>http://blog.cleancoder.com/uncle-bob/2015/11/18/TheProgrammersOath.html</a:t>
-            </a:r>
-            <a:endParaRPr lang="en-GB" sz="2600" dirty="0"/>
-          </a:p>
-          <a:p>
-            <a:endParaRPr lang="en-GB" dirty="0" smtClean="0"/>
+              <a:rPr lang="en-GB" sz="3000" dirty="0" smtClean="0"/>
+              <a:t>Reasons </a:t>
+            </a:r>
+            <a:r>
+              <a:rPr lang="en-GB" sz="3000" dirty="0"/>
+              <a:t>to use a mock object</a:t>
+            </a:r>
           </a:p>
           <a:p>
             <a:pPr marL="0" indent="0">
               <a:buNone/>
             </a:pPr>
             <a:r>
-              <a:rPr lang="en-GB" sz="3000" dirty="0" smtClean="0"/>
-              <a:t>Reasons </a:t>
-            </a:r>
-            <a:r>
-              <a:rPr lang="en-GB" sz="3000" dirty="0"/>
-              <a:t>to use a mock object</a:t>
-            </a:r>
+              <a:rPr lang="en-GB" sz="1900" dirty="0"/>
+              <a:t>http://www.ccs.neu.edu/research/demeter/related-work/extreme-programming/MockObjectsFinal.PDF</a:t>
+            </a:r>
+            <a:endParaRPr lang="en-GB" dirty="0"/>
           </a:p>
           <a:p>
             <a:pPr marL="0" indent="0">
               <a:buNone/>
             </a:pPr>
             <a:r>
-              <a:rPr lang="en-GB" sz="1900" dirty="0"/>
-              <a:t>http://www.ccs.neu.edu/research/demeter/related-work/extreme-programming/MockObjectsFinal.PDF</a:t>
-            </a:r>
-            <a:endParaRPr lang="en-GB" dirty="0"/>
-          </a:p>
-          <a:p>
-            <a:endParaRPr lang="en-GB" dirty="0"/>
+              <a:rPr lang="en-GB" sz="3000" dirty="0" smtClean="0"/>
+              <a:t>Classical/</a:t>
+            </a:r>
+            <a:r>
+              <a:rPr lang="en-GB" sz="3000" dirty="0" err="1" smtClean="0"/>
+              <a:t>Mockist</a:t>
+            </a:r>
+            <a:r>
+              <a:rPr lang="en-GB" sz="3000" dirty="0" smtClean="0"/>
+              <a:t> TDD</a:t>
+            </a:r>
           </a:p>
           <a:p>
             <a:pPr marL="0" indent="0">
               <a:buNone/>
             </a:pPr>
             <a:r>
-              <a:rPr lang="en-GB" sz="3000" dirty="0" smtClean="0"/>
-              <a:t>Other </a:t>
-            </a:r>
-            <a:r>
-              <a:rPr lang="en-GB" sz="3000" dirty="0" smtClean="0"/>
-              <a:t>Testing Frameworks</a:t>
-            </a:r>
-            <a:endParaRPr lang="en-GB" dirty="0"/>
+              <a:rPr lang="en-GB" sz="2000" dirty="0"/>
+              <a:t>http://martinfowler.com/articles/mocksArentStubs.html</a:t>
+            </a:r>
+            <a:endParaRPr lang="en-GB" sz="2000" dirty="0"/>
           </a:p>
           <a:p>
             <a:pPr marL="0" indent="0">
               <a:buNone/>
             </a:pPr>
             <a:r>
-              <a:rPr lang="en-GB" sz="2200" dirty="0"/>
-              <a:t>atoum.org</a:t>
-            </a:r>
+              <a:rPr lang="en-GB" sz="3000" dirty="0" smtClean="0"/>
+              <a:t>Other Testing Frameworks</a:t>
+            </a:r>
+            <a:endParaRPr lang="en-GB" dirty="0"/>
           </a:p>
           <a:p>
             <a:pPr marL="0" indent="0">
               <a:buNone/>
             </a:pPr>
             <a:r>
-              <a:rPr lang="en-GB" sz="2200" dirty="0"/>
-              <a:t>docs.mockery.io</a:t>
-            </a:r>
+              <a:rPr lang="en-GB" sz="2000" dirty="0" smtClean="0"/>
+              <a:t>http://atoum.org</a:t>
+            </a:r>
+            <a:endParaRPr lang="en-GB" sz="2000" dirty="0"/>
+          </a:p>
+          <a:p>
+            <a:pPr marL="0" indent="0">
+              <a:buNone/>
+            </a:pPr>
+            <a:r>
+              <a:rPr lang="en-GB" sz="2000" dirty="0" smtClean="0"/>
+              <a:t>http://docs.mockery.io</a:t>
+            </a:r>
+            <a:endParaRPr lang="en-GB" sz="2000" dirty="0"/>
           </a:p>
         </p:txBody>
       </p:sp>
@@ -39468,7 +39481,7 @@
   <a:extraClrSchemeLst/>
   <a:extLst>
     <a:ext uri="{05A4C25C-085E-4340-85A3-A5531E510DB2}">
-      <thm15:themeFamily xmlns:thm15="http://schemas.microsoft.com/office/thememl/2012/main" xmlns="" name="Office Theme" id="{62F939B6-93AF-4DB8-9C6B-D6C7DFDC589F}" vid="{4A3C46E8-61CC-4603-A589-7422A47A8E4A}"/>
+      <thm15:themeFamily xmlns="" xmlns:thm15="http://schemas.microsoft.com/office/thememl/2012/main" name="Office Theme" id="{62F939B6-93AF-4DB8-9C6B-D6C7DFDC589F}" vid="{4A3C46E8-61CC-4603-A589-7422A47A8E4A}"/>
     </a:ext>
   </a:extLst>
 </a:theme>
@@ -39729,7 +39742,7 @@
   <a:extraClrSchemeLst/>
   <a:extLst>
     <a:ext uri="{05A4C25C-085E-4340-85A3-A5531E510DB2}">
-      <thm15:themeFamily xmlns:thm15="http://schemas.microsoft.com/office/thememl/2012/main" xmlns="" name="Office Theme" id="{62F939B6-93AF-4DB8-9C6B-D6C7DFDC589F}" vid="{4A3C46E8-61CC-4603-A589-7422A47A8E4A}"/>
+      <thm15:themeFamily xmlns="" xmlns:thm15="http://schemas.microsoft.com/office/thememl/2012/main" name="Office Theme" id="{62F939B6-93AF-4DB8-9C6B-D6C7DFDC589F}" vid="{4A3C46E8-61CC-4603-A589-7422A47A8E4A}"/>
     </a:ext>
   </a:extLst>
 </a:theme>

</xml_diff>